<commit_message>
Moving backend code to repository ...
</commit_message>
<xml_diff>
--- a/MVC.pptx
+++ b/MVC.pptx
@@ -6,6 +6,8 @@
   </p:sldMasterIdLst>
   <p:sldIdLst>
     <p:sldId id="256" r:id="rId2"/>
+    <p:sldId id="257" r:id="rId3"/>
+    <p:sldId id="258" r:id="rId4"/>
   </p:sldIdLst>
   <p:sldSz cx="12192000" cy="6858000"/>
   <p:notesSz cx="6858000" cy="9144000"/>
@@ -4208,6 +4210,641 @@
 </p:sld>
 </file>
 
+<file path=ppt/slides/slide2.xml><?xml version="1.0" encoding="utf-8"?>
+<p:sld xmlns:a="http://schemas.openxmlformats.org/drawingml/2006/main" xmlns:r="http://schemas.openxmlformats.org/officeDocument/2006/relationships" xmlns:p="http://schemas.openxmlformats.org/presentationml/2006/main">
+  <p:cSld>
+    <p:spTree>
+      <p:nvGrpSpPr>
+        <p:cNvPr id="1" name=""/>
+        <p:cNvGrpSpPr/>
+        <p:nvPr/>
+      </p:nvGrpSpPr>
+      <p:grpSpPr>
+        <a:xfrm>
+          <a:off x="0" y="0"/>
+          <a:ext cx="0" cy="0"/>
+          <a:chOff x="0" y="0"/>
+          <a:chExt cx="0" cy="0"/>
+        </a:xfrm>
+      </p:grpSpPr>
+      <p:sp>
+        <p:nvSpPr>
+          <p:cNvPr id="4" name="Rectangle 3"/>
+          <p:cNvSpPr/>
+          <p:nvPr/>
+        </p:nvSpPr>
+        <p:spPr>
+          <a:xfrm>
+            <a:off x="3597442" y="685800"/>
+            <a:ext cx="4644190" cy="782053"/>
+          </a:xfrm>
+          <a:prstGeom prst="rect">
+            <a:avLst/>
+          </a:prstGeom>
+        </p:spPr>
+        <p:style>
+          <a:lnRef idx="2">
+            <a:schemeClr val="accent1">
+              <a:shade val="50000"/>
+            </a:schemeClr>
+          </a:lnRef>
+          <a:fillRef idx="1">
+            <a:schemeClr val="accent1"/>
+          </a:fillRef>
+          <a:effectRef idx="0">
+            <a:schemeClr val="accent1"/>
+          </a:effectRef>
+          <a:fontRef idx="minor">
+            <a:schemeClr val="lt1"/>
+          </a:fontRef>
+        </p:style>
+        <p:txBody>
+          <a:bodyPr rtlCol="0" anchor="ctr"/>
+          <a:lstStyle/>
+          <a:p>
+            <a:pPr algn="ctr"/>
+            <a:r>
+              <a:rPr lang="en-US" dirty="0" smtClean="0"/>
+              <a:t>Browser</a:t>
+            </a:r>
+            <a:endParaRPr lang="en-US" dirty="0"/>
+          </a:p>
+        </p:txBody>
+      </p:sp>
+      <p:sp>
+        <p:nvSpPr>
+          <p:cNvPr id="5" name="Rectangle 4"/>
+          <p:cNvSpPr/>
+          <p:nvPr/>
+        </p:nvSpPr>
+        <p:spPr>
+          <a:xfrm>
+            <a:off x="3597442" y="1973179"/>
+            <a:ext cx="4644190" cy="782053"/>
+          </a:xfrm>
+          <a:prstGeom prst="rect">
+            <a:avLst/>
+          </a:prstGeom>
+        </p:spPr>
+        <p:style>
+          <a:lnRef idx="2">
+            <a:schemeClr val="accent1">
+              <a:shade val="50000"/>
+            </a:schemeClr>
+          </a:lnRef>
+          <a:fillRef idx="1">
+            <a:schemeClr val="accent1"/>
+          </a:fillRef>
+          <a:effectRef idx="0">
+            <a:schemeClr val="accent1"/>
+          </a:effectRef>
+          <a:fontRef idx="minor">
+            <a:schemeClr val="lt1"/>
+          </a:fontRef>
+        </p:style>
+        <p:txBody>
+          <a:bodyPr rtlCol="0" anchor="ctr"/>
+          <a:lstStyle/>
+          <a:p>
+            <a:pPr algn="ctr"/>
+            <a:r>
+              <a:rPr lang="en-US" dirty="0" smtClean="0"/>
+              <a:t>IIS (Web Server) (Specific IP) – Rails, Apache</a:t>
+            </a:r>
+            <a:endParaRPr lang="en-US" dirty="0"/>
+          </a:p>
+        </p:txBody>
+      </p:sp>
+      <p:cxnSp>
+        <p:nvCxnSpPr>
+          <p:cNvPr id="8" name="Straight Arrow Connector 7"/>
+          <p:cNvCxnSpPr/>
+          <p:nvPr/>
+        </p:nvCxnSpPr>
+        <p:spPr>
+          <a:xfrm>
+            <a:off x="4620126" y="1467853"/>
+            <a:ext cx="0" cy="505326"/>
+          </a:xfrm>
+          <a:prstGeom prst="straightConnector1">
+            <a:avLst/>
+          </a:prstGeom>
+          <a:ln>
+            <a:tailEnd type="triangle"/>
+          </a:ln>
+        </p:spPr>
+        <p:style>
+          <a:lnRef idx="1">
+            <a:schemeClr val="accent1"/>
+          </a:lnRef>
+          <a:fillRef idx="0">
+            <a:schemeClr val="accent1"/>
+          </a:fillRef>
+          <a:effectRef idx="0">
+            <a:schemeClr val="accent1"/>
+          </a:effectRef>
+          <a:fontRef idx="minor">
+            <a:schemeClr val="tx1"/>
+          </a:fontRef>
+        </p:style>
+      </p:cxnSp>
+      <p:sp>
+        <p:nvSpPr>
+          <p:cNvPr id="9" name="TextBox 8"/>
+          <p:cNvSpPr txBox="1"/>
+          <p:nvPr/>
+        </p:nvSpPr>
+        <p:spPr>
+          <a:xfrm>
+            <a:off x="319942" y="1355240"/>
+            <a:ext cx="3277500" cy="646331"/>
+          </a:xfrm>
+          <a:prstGeom prst="rect">
+            <a:avLst/>
+          </a:prstGeom>
+          <a:noFill/>
+        </p:spPr>
+        <p:txBody>
+          <a:bodyPr wrap="none" rtlCol="0">
+            <a:spAutoFit/>
+          </a:bodyPr>
+          <a:lstStyle/>
+          <a:p>
+            <a:r>
+              <a:rPr lang="en-US" dirty="0" smtClean="0"/>
+              <a:t>IP, Port – Reach a server thro TCP</a:t>
+            </a:r>
+          </a:p>
+          <a:p>
+            <a:r>
+              <a:rPr lang="en-US" dirty="0" smtClean="0"/>
+              <a:t>Request (filename, </a:t>
+            </a:r>
+            <a:r>
+              <a:rPr lang="en-US" dirty="0" err="1" smtClean="0"/>
+              <a:t>extn</a:t>
+            </a:r>
+            <a:r>
+              <a:rPr lang="en-US" dirty="0" smtClean="0"/>
+              <a:t>)</a:t>
+            </a:r>
+            <a:endParaRPr lang="en-US" dirty="0"/>
+          </a:p>
+        </p:txBody>
+      </p:sp>
+      <p:sp>
+        <p:nvSpPr>
+          <p:cNvPr id="11" name="TextBox 10"/>
+          <p:cNvSpPr txBox="1"/>
+          <p:nvPr/>
+        </p:nvSpPr>
+        <p:spPr>
+          <a:xfrm>
+            <a:off x="7455566" y="1519628"/>
+            <a:ext cx="3467681" cy="369332"/>
+          </a:xfrm>
+          <a:prstGeom prst="rect">
+            <a:avLst/>
+          </a:prstGeom>
+          <a:noFill/>
+        </p:spPr>
+        <p:txBody>
+          <a:bodyPr wrap="none" rtlCol="0">
+            <a:spAutoFit/>
+          </a:bodyPr>
+          <a:lstStyle/>
+          <a:p>
+            <a:r>
+              <a:rPr lang="en-US" dirty="0" smtClean="0"/>
+              <a:t>Send the HTML content to browser</a:t>
+            </a:r>
+            <a:endParaRPr lang="en-US" dirty="0"/>
+          </a:p>
+        </p:txBody>
+      </p:sp>
+      <p:sp>
+        <p:nvSpPr>
+          <p:cNvPr id="12" name="Rectangle 11"/>
+          <p:cNvSpPr/>
+          <p:nvPr/>
+        </p:nvSpPr>
+        <p:spPr>
+          <a:xfrm>
+            <a:off x="3597442" y="3416969"/>
+            <a:ext cx="4644190" cy="782053"/>
+          </a:xfrm>
+          <a:prstGeom prst="rect">
+            <a:avLst/>
+          </a:prstGeom>
+        </p:spPr>
+        <p:style>
+          <a:lnRef idx="2">
+            <a:schemeClr val="accent1">
+              <a:shade val="50000"/>
+            </a:schemeClr>
+          </a:lnRef>
+          <a:fillRef idx="1">
+            <a:schemeClr val="accent1"/>
+          </a:fillRef>
+          <a:effectRef idx="0">
+            <a:schemeClr val="accent1"/>
+          </a:effectRef>
+          <a:fontRef idx="minor">
+            <a:schemeClr val="lt1"/>
+          </a:fontRef>
+        </p:style>
+        <p:txBody>
+          <a:bodyPr rtlCol="0" anchor="ctr"/>
+          <a:lstStyle/>
+          <a:p>
+            <a:pPr algn="ctr"/>
+            <a:r>
+              <a:rPr lang="en-US" dirty="0" smtClean="0"/>
+              <a:t>ASP.NET (Framework) – Ruby, Struts, Spring</a:t>
+            </a:r>
+            <a:endParaRPr lang="en-US" dirty="0"/>
+          </a:p>
+        </p:txBody>
+      </p:sp>
+      <p:cxnSp>
+        <p:nvCxnSpPr>
+          <p:cNvPr id="15" name="Straight Arrow Connector 14"/>
+          <p:cNvCxnSpPr/>
+          <p:nvPr/>
+        </p:nvCxnSpPr>
+        <p:spPr>
+          <a:xfrm>
+            <a:off x="4620126" y="2755232"/>
+            <a:ext cx="0" cy="661737"/>
+          </a:xfrm>
+          <a:prstGeom prst="straightConnector1">
+            <a:avLst/>
+          </a:prstGeom>
+          <a:ln>
+            <a:tailEnd type="triangle"/>
+          </a:ln>
+        </p:spPr>
+        <p:style>
+          <a:lnRef idx="1">
+            <a:schemeClr val="accent1"/>
+          </a:lnRef>
+          <a:fillRef idx="0">
+            <a:schemeClr val="accent1"/>
+          </a:fillRef>
+          <a:effectRef idx="0">
+            <a:schemeClr val="accent1"/>
+          </a:effectRef>
+          <a:fontRef idx="minor">
+            <a:schemeClr val="tx1"/>
+          </a:fontRef>
+        </p:style>
+      </p:cxnSp>
+      <p:sp>
+        <p:nvSpPr>
+          <p:cNvPr id="17" name="Rectangle 16"/>
+          <p:cNvSpPr/>
+          <p:nvPr/>
+        </p:nvSpPr>
+        <p:spPr>
+          <a:xfrm>
+            <a:off x="1877925" y="2871353"/>
+            <a:ext cx="2483629" cy="369332"/>
+          </a:xfrm>
+          <a:prstGeom prst="rect">
+            <a:avLst/>
+          </a:prstGeom>
+        </p:spPr>
+        <p:txBody>
+          <a:bodyPr wrap="none">
+            <a:spAutoFit/>
+          </a:bodyPr>
+          <a:lstStyle/>
+          <a:p>
+            <a:r>
+              <a:rPr lang="en-US" dirty="0" smtClean="0"/>
+              <a:t>Request (filename, </a:t>
+            </a:r>
+            <a:r>
+              <a:rPr lang="en-US" dirty="0" err="1" smtClean="0"/>
+              <a:t>extn</a:t>
+            </a:r>
+            <a:r>
+              <a:rPr lang="en-US" dirty="0" smtClean="0"/>
+              <a:t>)</a:t>
+            </a:r>
+            <a:endParaRPr lang="en-US" dirty="0"/>
+          </a:p>
+        </p:txBody>
+      </p:sp>
+      <p:sp>
+        <p:nvSpPr>
+          <p:cNvPr id="18" name="Cloud Callout 17"/>
+          <p:cNvSpPr/>
+          <p:nvPr/>
+        </p:nvSpPr>
+        <p:spPr>
+          <a:xfrm>
+            <a:off x="4501817" y="4860759"/>
+            <a:ext cx="2835440" cy="1239253"/>
+          </a:xfrm>
+          <a:prstGeom prst="cloudCallout">
+            <a:avLst/>
+          </a:prstGeom>
+        </p:spPr>
+        <p:style>
+          <a:lnRef idx="2">
+            <a:schemeClr val="accent1">
+              <a:shade val="50000"/>
+            </a:schemeClr>
+          </a:lnRef>
+          <a:fillRef idx="1">
+            <a:schemeClr val="accent1"/>
+          </a:fillRef>
+          <a:effectRef idx="0">
+            <a:schemeClr val="accent1"/>
+          </a:effectRef>
+          <a:fontRef idx="minor">
+            <a:schemeClr val="lt1"/>
+          </a:fontRef>
+        </p:style>
+        <p:txBody>
+          <a:bodyPr rtlCol="0" anchor="ctr"/>
+          <a:lstStyle/>
+          <a:p>
+            <a:pPr algn="ctr"/>
+            <a:r>
+              <a:rPr lang="en-US" dirty="0" smtClean="0"/>
+              <a:t>Our program …</a:t>
+            </a:r>
+            <a:endParaRPr lang="en-US" dirty="0"/>
+          </a:p>
+        </p:txBody>
+      </p:sp>
+      <p:sp>
+        <p:nvSpPr>
+          <p:cNvPr id="19" name="TextBox 18"/>
+          <p:cNvSpPr txBox="1"/>
+          <p:nvPr/>
+        </p:nvSpPr>
+        <p:spPr>
+          <a:xfrm>
+            <a:off x="7359313" y="2901434"/>
+            <a:ext cx="4888326" cy="369332"/>
+          </a:xfrm>
+          <a:prstGeom prst="rect">
+            <a:avLst/>
+          </a:prstGeom>
+          <a:noFill/>
+        </p:spPr>
+        <p:txBody>
+          <a:bodyPr wrap="none" rtlCol="0">
+            <a:spAutoFit/>
+          </a:bodyPr>
+          <a:lstStyle/>
+          <a:p>
+            <a:r>
+              <a:rPr lang="en-US" dirty="0" smtClean="0"/>
+              <a:t>Send the HTML/CSS/</a:t>
+            </a:r>
+            <a:r>
+              <a:rPr lang="en-US" dirty="0" err="1" smtClean="0"/>
+              <a:t>Javascript</a:t>
+            </a:r>
+            <a:r>
+              <a:rPr lang="en-US" dirty="0" smtClean="0"/>
+              <a:t> content to browser</a:t>
+            </a:r>
+            <a:endParaRPr lang="en-US" dirty="0"/>
+          </a:p>
+        </p:txBody>
+      </p:sp>
+      <p:cxnSp>
+        <p:nvCxnSpPr>
+          <p:cNvPr id="21" name="Straight Arrow Connector 20"/>
+          <p:cNvCxnSpPr>
+            <a:stCxn id="12" idx="2"/>
+            <a:endCxn id="18" idx="3"/>
+          </p:cNvCxnSpPr>
+          <p:nvPr/>
+        </p:nvCxnSpPr>
+        <p:spPr>
+          <a:xfrm>
+            <a:off x="5919537" y="4199022"/>
+            <a:ext cx="0" cy="732592"/>
+          </a:xfrm>
+          <a:prstGeom prst="straightConnector1">
+            <a:avLst/>
+          </a:prstGeom>
+          <a:ln>
+            <a:headEnd type="triangle"/>
+            <a:tailEnd type="triangle"/>
+          </a:ln>
+        </p:spPr>
+        <p:style>
+          <a:lnRef idx="1">
+            <a:schemeClr val="accent1"/>
+          </a:lnRef>
+          <a:fillRef idx="0">
+            <a:schemeClr val="accent1"/>
+          </a:fillRef>
+          <a:effectRef idx="0">
+            <a:schemeClr val="accent1"/>
+          </a:effectRef>
+          <a:fontRef idx="minor">
+            <a:schemeClr val="tx1"/>
+          </a:fontRef>
+        </p:style>
+      </p:cxnSp>
+    </p:spTree>
+    <p:extLst>
+      <p:ext uri="{BB962C8B-B14F-4D97-AF65-F5344CB8AC3E}">
+        <p14:creationId xmlns:p14="http://schemas.microsoft.com/office/powerpoint/2010/main" val="446549108"/>
+      </p:ext>
+    </p:extLst>
+  </p:cSld>
+  <p:clrMapOvr>
+    <a:masterClrMapping/>
+  </p:clrMapOvr>
+</p:sld>
+</file>
+
+<file path=ppt/slides/slide3.xml><?xml version="1.0" encoding="utf-8"?>
+<p:sld xmlns:a="http://schemas.openxmlformats.org/drawingml/2006/main" xmlns:r="http://schemas.openxmlformats.org/officeDocument/2006/relationships" xmlns:p="http://schemas.openxmlformats.org/presentationml/2006/main">
+  <p:cSld>
+    <p:spTree>
+      <p:nvGrpSpPr>
+        <p:cNvPr id="1" name=""/>
+        <p:cNvGrpSpPr/>
+        <p:nvPr/>
+      </p:nvGrpSpPr>
+      <p:grpSpPr>
+        <a:xfrm>
+          <a:off x="0" y="0"/>
+          <a:ext cx="0" cy="0"/>
+          <a:chOff x="0" y="0"/>
+          <a:chExt cx="0" cy="0"/>
+        </a:xfrm>
+      </p:grpSpPr>
+      <p:sp>
+        <p:nvSpPr>
+          <p:cNvPr id="2" name="Title 1"/>
+          <p:cNvSpPr>
+            <a:spLocks noGrp="1"/>
+          </p:cNvSpPr>
+          <p:nvPr>
+            <p:ph type="title"/>
+          </p:nvPr>
+        </p:nvSpPr>
+        <p:spPr/>
+        <p:txBody>
+          <a:bodyPr/>
+          <a:lstStyle/>
+          <a:p>
+            <a:endParaRPr lang="en-US"/>
+          </a:p>
+        </p:txBody>
+      </p:sp>
+      <p:sp>
+        <p:nvSpPr>
+          <p:cNvPr id="3" name="Content Placeholder 2"/>
+          <p:cNvSpPr>
+            <a:spLocks noGrp="1"/>
+          </p:cNvSpPr>
+          <p:nvPr>
+            <p:ph idx="1"/>
+          </p:nvPr>
+        </p:nvSpPr>
+        <p:spPr/>
+        <p:txBody>
+          <a:bodyPr>
+            <a:normAutofit fontScale="92500" lnSpcReduction="20000"/>
+          </a:bodyPr>
+          <a:lstStyle/>
+          <a:p>
+            <a:pPr marL="0" indent="0">
+              <a:buNone/>
+            </a:pPr>
+            <a:r>
+              <a:rPr lang="en-US" dirty="0" smtClean="0">
+                <a:hlinkClick r:id="rId2"/>
+              </a:rPr>
+              <a:t>http://localhost/mvcsite/home/index</a:t>
+            </a:r>
+            <a:endParaRPr lang="en-US" dirty="0" smtClean="0"/>
+          </a:p>
+          <a:p>
+            <a:pPr marL="0" indent="0">
+              <a:buNone/>
+            </a:pPr>
+            <a:r>
+              <a:rPr lang="en-US" dirty="0" smtClean="0">
+                <a:hlinkClick r:id="rId2"/>
+              </a:rPr>
+              <a:t>http://localhost/mvcsite/home/</a:t>
+            </a:r>
+            <a:r>
+              <a:rPr lang="en-US" dirty="0" smtClean="0"/>
+              <a:t>about</a:t>
+            </a:r>
+          </a:p>
+          <a:p>
+            <a:pPr marL="0" indent="0">
+              <a:buNone/>
+            </a:pPr>
+            <a:r>
+              <a:rPr lang="en-US" dirty="0" smtClean="0">
+                <a:hlinkClick r:id="rId2"/>
+              </a:rPr>
+              <a:t>http://localhost/mvcsite/home/</a:t>
+            </a:r>
+            <a:r>
+              <a:rPr lang="en-US" dirty="0" smtClean="0"/>
+              <a:t>contact</a:t>
+            </a:r>
+          </a:p>
+          <a:p>
+            <a:pPr marL="0" indent="0">
+              <a:buNone/>
+            </a:pPr>
+            <a:endParaRPr lang="en-US" dirty="0" smtClean="0"/>
+          </a:p>
+          <a:p>
+            <a:pPr marL="0" indent="0">
+              <a:buNone/>
+            </a:pPr>
+            <a:endParaRPr lang="en-US" dirty="0"/>
+          </a:p>
+          <a:p>
+            <a:pPr marL="0" indent="0">
+              <a:buNone/>
+            </a:pPr>
+            <a:r>
+              <a:rPr lang="en-US" dirty="0" err="1" smtClean="0"/>
+              <a:t>Localhost</a:t>
+            </a:r>
+            <a:r>
+              <a:rPr lang="en-US" dirty="0" smtClean="0"/>
+              <a:t> -&gt; Server location</a:t>
+            </a:r>
+          </a:p>
+          <a:p>
+            <a:pPr marL="0" indent="0">
+              <a:buNone/>
+            </a:pPr>
+            <a:r>
+              <a:rPr lang="en-US" dirty="0" err="1" smtClean="0"/>
+              <a:t>Mvcsite</a:t>
+            </a:r>
+            <a:r>
+              <a:rPr lang="en-US" dirty="0" smtClean="0"/>
+              <a:t> -&gt; virtual directory</a:t>
+            </a:r>
+          </a:p>
+          <a:p>
+            <a:pPr marL="0" indent="0">
+              <a:buNone/>
+            </a:pPr>
+            <a:endParaRPr lang="en-US" dirty="0" smtClean="0"/>
+          </a:p>
+          <a:p>
+            <a:pPr marL="0" indent="0">
+              <a:buNone/>
+            </a:pPr>
+            <a:r>
+              <a:rPr lang="en-US" dirty="0" smtClean="0"/>
+              <a:t>Home -&gt; Controller</a:t>
+            </a:r>
+          </a:p>
+          <a:p>
+            <a:pPr marL="0" indent="0">
+              <a:buNone/>
+            </a:pPr>
+            <a:r>
+              <a:rPr lang="en-US" dirty="0" smtClean="0"/>
+              <a:t>Index/about/contact -&gt; Actions</a:t>
+            </a:r>
+          </a:p>
+          <a:p>
+            <a:pPr marL="0" indent="0">
+              <a:buNone/>
+            </a:pPr>
+            <a:endParaRPr lang="en-US" dirty="0"/>
+          </a:p>
+        </p:txBody>
+      </p:sp>
+    </p:spTree>
+    <p:extLst>
+      <p:ext uri="{BB962C8B-B14F-4D97-AF65-F5344CB8AC3E}">
+        <p14:creationId xmlns:p14="http://schemas.microsoft.com/office/powerpoint/2010/main" val="1302851004"/>
+      </p:ext>
+    </p:extLst>
+  </p:cSld>
+  <p:clrMapOvr>
+    <a:masterClrMapping/>
+  </p:clrMapOvr>
+</p:sld>
+</file>
+
 <file path=ppt/theme/theme1.xml><?xml version="1.0" encoding="utf-8"?>
 <a:theme xmlns:a="http://schemas.openxmlformats.org/drawingml/2006/main" name="Office Theme">
   <a:themeElements>

</xml_diff>